<commit_message>
Refactor Task 4 Linear Regression documentation and update presentation
</commit_message>
<xml_diff>
--- a/Tasks/FA23BCS117_FA23BCS108_Task4_LinearRegression/FA23BCS117_FA23BCS108_Task4_LinearRegression.pptx
+++ b/Tasks/FA23BCS117_FA23BCS108_Task4_LinearRegression/FA23BCS117_FA23BCS108_Task4_LinearRegression.pptx
@@ -2,7 +2,7 @@
 <file path=ppt/presentation.xml><?xml version="1.0" encoding="utf-8"?>
 <p:presentation xmlns:a="http://schemas.openxmlformats.org/drawingml/2006/main" xmlns:r="http://schemas.openxmlformats.org/officeDocument/2006/relationships" xmlns:p="http://schemas.openxmlformats.org/presentationml/2006/main" saveSubsetFonts="1" autoCompressPictures="0">
   <p:sldMasterIdLst>
-    <p:sldMasterId id="2147483660" r:id="rId1"/>
+    <p:sldMasterId id="2147483690" r:id="rId1"/>
   </p:sldMasterIdLst>
   <p:sldIdLst>
     <p:sldId id="256" r:id="rId2"/>
@@ -305,7 +305,7 @@
           <a:p>
             <a:fld id="{5BCAD085-E8A6-8845-BD4E-CB4CCA059FC4}" type="datetimeFigureOut">
               <a:rPr lang="en-US" smtClean="0"/>
-              <a:t>10/3/25</a:t>
+              <a:t>10/3/2025</a:t>
             </a:fld>
             <a:endParaRPr lang="en-US"/>
           </a:p>
@@ -366,7 +366,7 @@
     </p:spTree>
     <p:extLst>
       <p:ext uri="{BB962C8B-B14F-4D97-AF65-F5344CB8AC3E}">
-        <p14:creationId xmlns:p14="http://schemas.microsoft.com/office/powerpoint/2010/main" val="1307339820"/>
+        <p14:creationId xmlns:p14="http://schemas.microsoft.com/office/powerpoint/2010/main" val="2423593821"/>
       </p:ext>
     </p:extLst>
   </p:cSld>
@@ -572,7 +572,7 @@
           <a:p>
             <a:fld id="{5BCAD085-E8A6-8845-BD4E-CB4CCA059FC4}" type="datetimeFigureOut">
               <a:rPr lang="en-US" smtClean="0"/>
-              <a:t>10/3/25</a:t>
+              <a:t>10/3/2025</a:t>
             </a:fld>
             <a:endParaRPr lang="en-US"/>
           </a:p>
@@ -623,7 +623,7 @@
     </p:spTree>
     <p:extLst>
       <p:ext uri="{BB962C8B-B14F-4D97-AF65-F5344CB8AC3E}">
-        <p14:creationId xmlns:p14="http://schemas.microsoft.com/office/powerpoint/2010/main" val="1348524706"/>
+        <p14:creationId xmlns:p14="http://schemas.microsoft.com/office/powerpoint/2010/main" val="2253982989"/>
       </p:ext>
     </p:extLst>
   </p:cSld>
@@ -803,7 +803,7 @@
           <a:p>
             <a:fld id="{5BCAD085-E8A6-8845-BD4E-CB4CCA059FC4}" type="datetimeFigureOut">
               <a:rPr lang="en-US" smtClean="0"/>
-              <a:t>10/3/25</a:t>
+              <a:t>10/3/2025</a:t>
             </a:fld>
             <a:endParaRPr lang="en-US"/>
           </a:p>
@@ -864,7 +864,7 @@
     </p:spTree>
     <p:extLst>
       <p:ext uri="{BB962C8B-B14F-4D97-AF65-F5344CB8AC3E}">
-        <p14:creationId xmlns:p14="http://schemas.microsoft.com/office/powerpoint/2010/main" val="4050843940"/>
+        <p14:creationId xmlns:p14="http://schemas.microsoft.com/office/powerpoint/2010/main" val="2743764162"/>
       </p:ext>
     </p:extLst>
   </p:cSld>
@@ -1113,7 +1113,7 @@
           <a:p>
             <a:fld id="{5BCAD085-E8A6-8845-BD4E-CB4CCA059FC4}" type="datetimeFigureOut">
               <a:rPr lang="en-US" smtClean="0"/>
-              <a:t>10/3/25</a:t>
+              <a:t>10/3/2025</a:t>
             </a:fld>
             <a:endParaRPr lang="en-US"/>
           </a:p>
@@ -1406,7 +1406,7 @@
     </p:spTree>
     <p:extLst>
       <p:ext uri="{BB962C8B-B14F-4D97-AF65-F5344CB8AC3E}">
-        <p14:creationId xmlns:p14="http://schemas.microsoft.com/office/powerpoint/2010/main" val="3176324860"/>
+        <p14:creationId xmlns:p14="http://schemas.microsoft.com/office/powerpoint/2010/main" val="2427888135"/>
       </p:ext>
     </p:extLst>
   </p:cSld>
@@ -1586,7 +1586,7 @@
           <a:p>
             <a:fld id="{5BCAD085-E8A6-8845-BD4E-CB4CCA059FC4}" type="datetimeFigureOut">
               <a:rPr lang="en-US" smtClean="0"/>
-              <a:t>10/3/25</a:t>
+              <a:t>10/3/2025</a:t>
             </a:fld>
             <a:endParaRPr lang="en-US"/>
           </a:p>
@@ -1647,7 +1647,7 @@
     </p:spTree>
     <p:extLst>
       <p:ext uri="{BB962C8B-B14F-4D97-AF65-F5344CB8AC3E}">
-        <p14:creationId xmlns:p14="http://schemas.microsoft.com/office/powerpoint/2010/main" val="1913872801"/>
+        <p14:creationId xmlns:p14="http://schemas.microsoft.com/office/powerpoint/2010/main" val="2002612576"/>
       </p:ext>
     </p:extLst>
   </p:cSld>
@@ -2133,7 +2133,7 @@
           <a:p>
             <a:fld id="{5BCAD085-E8A6-8845-BD4E-CB4CCA059FC4}" type="datetimeFigureOut">
               <a:rPr lang="en-US" smtClean="0"/>
-              <a:t>10/3/25</a:t>
+              <a:t>10/3/2025</a:t>
             </a:fld>
             <a:endParaRPr lang="en-US"/>
           </a:p>
@@ -2184,7 +2184,7 @@
     </p:spTree>
     <p:extLst>
       <p:ext uri="{BB962C8B-B14F-4D97-AF65-F5344CB8AC3E}">
-        <p14:creationId xmlns:p14="http://schemas.microsoft.com/office/powerpoint/2010/main" val="4124058201"/>
+        <p14:creationId xmlns:p14="http://schemas.microsoft.com/office/powerpoint/2010/main" val="4104380946"/>
       </p:ext>
     </p:extLst>
   </p:cSld>
@@ -2907,7 +2907,7 @@
           <a:p>
             <a:fld id="{5BCAD085-E8A6-8845-BD4E-CB4CCA059FC4}" type="datetimeFigureOut">
               <a:rPr lang="en-US" smtClean="0"/>
-              <a:t>10/3/25</a:t>
+              <a:t>10/3/2025</a:t>
             </a:fld>
             <a:endParaRPr lang="en-US"/>
           </a:p>
@@ -2958,7 +2958,7 @@
     </p:spTree>
     <p:extLst>
       <p:ext uri="{BB962C8B-B14F-4D97-AF65-F5344CB8AC3E}">
-        <p14:creationId xmlns:p14="http://schemas.microsoft.com/office/powerpoint/2010/main" val="1547965913"/>
+        <p14:creationId xmlns:p14="http://schemas.microsoft.com/office/powerpoint/2010/main" val="545464091"/>
       </p:ext>
     </p:extLst>
   </p:cSld>
@@ -3082,7 +3082,7 @@
           <a:p>
             <a:fld id="{5BCAD085-E8A6-8845-BD4E-CB4CCA059FC4}" type="datetimeFigureOut">
               <a:rPr lang="en-US" smtClean="0"/>
-              <a:t>10/3/25</a:t>
+              <a:t>10/3/2025</a:t>
             </a:fld>
             <a:endParaRPr lang="en-US"/>
           </a:p>
@@ -3133,7 +3133,7 @@
     </p:spTree>
     <p:extLst>
       <p:ext uri="{BB962C8B-B14F-4D97-AF65-F5344CB8AC3E}">
-        <p14:creationId xmlns:p14="http://schemas.microsoft.com/office/powerpoint/2010/main" val="3742655130"/>
+        <p14:creationId xmlns:p14="http://schemas.microsoft.com/office/powerpoint/2010/main" val="3442282500"/>
       </p:ext>
     </p:extLst>
   </p:cSld>
@@ -3305,7 +3305,7 @@
           <a:p>
             <a:fld id="{5BCAD085-E8A6-8845-BD4E-CB4CCA059FC4}" type="datetimeFigureOut">
               <a:rPr lang="en-US" smtClean="0"/>
-              <a:t>10/3/25</a:t>
+              <a:t>10/3/2025</a:t>
             </a:fld>
             <a:endParaRPr lang="en-US"/>
           </a:p>
@@ -3366,7 +3366,7 @@
     </p:spTree>
     <p:extLst>
       <p:ext uri="{BB962C8B-B14F-4D97-AF65-F5344CB8AC3E}">
-        <p14:creationId xmlns:p14="http://schemas.microsoft.com/office/powerpoint/2010/main" val="1818091986"/>
+        <p14:creationId xmlns:p14="http://schemas.microsoft.com/office/powerpoint/2010/main" val="462654503"/>
       </p:ext>
     </p:extLst>
   </p:cSld>
@@ -3485,7 +3485,7 @@
           <a:p>
             <a:fld id="{5BCAD085-E8A6-8845-BD4E-CB4CCA059FC4}" type="datetimeFigureOut">
               <a:rPr lang="en-US" smtClean="0"/>
-              <a:t>10/3/25</a:t>
+              <a:t>10/3/2025</a:t>
             </a:fld>
             <a:endParaRPr lang="en-US"/>
           </a:p>
@@ -3536,7 +3536,7 @@
     </p:spTree>
     <p:extLst>
       <p:ext uri="{BB962C8B-B14F-4D97-AF65-F5344CB8AC3E}">
-        <p14:creationId xmlns:p14="http://schemas.microsoft.com/office/powerpoint/2010/main" val="4037429995"/>
+        <p14:creationId xmlns:p14="http://schemas.microsoft.com/office/powerpoint/2010/main" val="4215637562"/>
       </p:ext>
     </p:extLst>
   </p:cSld>
@@ -3774,7 +3774,7 @@
           <a:p>
             <a:fld id="{5BCAD085-E8A6-8845-BD4E-CB4CCA059FC4}" type="datetimeFigureOut">
               <a:rPr lang="en-US" smtClean="0"/>
-              <a:t>10/3/25</a:t>
+              <a:t>10/3/2025</a:t>
             </a:fld>
             <a:endParaRPr lang="en-US"/>
           </a:p>
@@ -3835,7 +3835,7 @@
     </p:spTree>
     <p:extLst>
       <p:ext uri="{BB962C8B-B14F-4D97-AF65-F5344CB8AC3E}">
-        <p14:creationId xmlns:p14="http://schemas.microsoft.com/office/powerpoint/2010/main" val="3485064313"/>
+        <p14:creationId xmlns:p14="http://schemas.microsoft.com/office/powerpoint/2010/main" val="1523191716"/>
       </p:ext>
     </p:extLst>
   </p:cSld>
@@ -4016,7 +4016,7 @@
           <a:p>
             <a:fld id="{5BCAD085-E8A6-8845-BD4E-CB4CCA059FC4}" type="datetimeFigureOut">
               <a:rPr lang="en-US" smtClean="0"/>
-              <a:t>10/3/25</a:t>
+              <a:t>10/3/2025</a:t>
             </a:fld>
             <a:endParaRPr lang="en-US"/>
           </a:p>
@@ -4067,7 +4067,7 @@
     </p:spTree>
     <p:extLst>
       <p:ext uri="{BB962C8B-B14F-4D97-AF65-F5344CB8AC3E}">
-        <p14:creationId xmlns:p14="http://schemas.microsoft.com/office/powerpoint/2010/main" val="1169750381"/>
+        <p14:creationId xmlns:p14="http://schemas.microsoft.com/office/powerpoint/2010/main" val="1769070357"/>
       </p:ext>
     </p:extLst>
   </p:cSld>
@@ -4395,7 +4395,7 @@
           <a:p>
             <a:fld id="{5BCAD085-E8A6-8845-BD4E-CB4CCA059FC4}" type="datetimeFigureOut">
               <a:rPr lang="en-US" smtClean="0"/>
-              <a:t>10/3/25</a:t>
+              <a:t>10/3/2025</a:t>
             </a:fld>
             <a:endParaRPr lang="en-US"/>
           </a:p>
@@ -4446,7 +4446,7 @@
     </p:spTree>
     <p:extLst>
       <p:ext uri="{BB962C8B-B14F-4D97-AF65-F5344CB8AC3E}">
-        <p14:creationId xmlns:p14="http://schemas.microsoft.com/office/powerpoint/2010/main" val="3767785021"/>
+        <p14:creationId xmlns:p14="http://schemas.microsoft.com/office/powerpoint/2010/main" val="758926607"/>
       </p:ext>
     </p:extLst>
   </p:cSld>
@@ -4513,7 +4513,7 @@
           <a:p>
             <a:fld id="{5BCAD085-E8A6-8845-BD4E-CB4CCA059FC4}" type="datetimeFigureOut">
               <a:rPr lang="en-US" smtClean="0"/>
-              <a:t>10/3/25</a:t>
+              <a:t>10/3/2025</a:t>
             </a:fld>
             <a:endParaRPr lang="en-US"/>
           </a:p>
@@ -4564,7 +4564,7 @@
     </p:spTree>
     <p:extLst>
       <p:ext uri="{BB962C8B-B14F-4D97-AF65-F5344CB8AC3E}">
-        <p14:creationId xmlns:p14="http://schemas.microsoft.com/office/powerpoint/2010/main" val="3348758631"/>
+        <p14:creationId xmlns:p14="http://schemas.microsoft.com/office/powerpoint/2010/main" val="3079794466"/>
       </p:ext>
     </p:extLst>
   </p:cSld>
@@ -4608,7 +4608,7 @@
           <a:p>
             <a:fld id="{5BCAD085-E8A6-8845-BD4E-CB4CCA059FC4}" type="datetimeFigureOut">
               <a:rPr lang="en-US" smtClean="0"/>
-              <a:t>10/3/25</a:t>
+              <a:t>10/3/2025</a:t>
             </a:fld>
             <a:endParaRPr lang="en-US"/>
           </a:p>
@@ -4659,7 +4659,7 @@
     </p:spTree>
     <p:extLst>
       <p:ext uri="{BB962C8B-B14F-4D97-AF65-F5344CB8AC3E}">
-        <p14:creationId xmlns:p14="http://schemas.microsoft.com/office/powerpoint/2010/main" val="705874510"/>
+        <p14:creationId xmlns:p14="http://schemas.microsoft.com/office/powerpoint/2010/main" val="2913489274"/>
       </p:ext>
     </p:extLst>
   </p:cSld>
@@ -4857,7 +4857,7 @@
           <a:p>
             <a:fld id="{5BCAD085-E8A6-8845-BD4E-CB4CCA059FC4}" type="datetimeFigureOut">
               <a:rPr lang="en-US" smtClean="0"/>
-              <a:t>10/3/25</a:t>
+              <a:t>10/3/2025</a:t>
             </a:fld>
             <a:endParaRPr lang="en-US"/>
           </a:p>
@@ -4908,7 +4908,7 @@
     </p:spTree>
     <p:extLst>
       <p:ext uri="{BB962C8B-B14F-4D97-AF65-F5344CB8AC3E}">
-        <p14:creationId xmlns:p14="http://schemas.microsoft.com/office/powerpoint/2010/main" val="1521029876"/>
+        <p14:creationId xmlns:p14="http://schemas.microsoft.com/office/powerpoint/2010/main" val="3639576855"/>
       </p:ext>
     </p:extLst>
   </p:cSld>
@@ -5114,7 +5114,7 @@
           <a:p>
             <a:fld id="{5BCAD085-E8A6-8845-BD4E-CB4CCA059FC4}" type="datetimeFigureOut">
               <a:rPr lang="en-US" smtClean="0"/>
-              <a:t>10/3/25</a:t>
+              <a:t>10/3/2025</a:t>
             </a:fld>
             <a:endParaRPr lang="en-US"/>
           </a:p>
@@ -5165,7 +5165,7 @@
     </p:spTree>
     <p:extLst>
       <p:ext uri="{BB962C8B-B14F-4D97-AF65-F5344CB8AC3E}">
-        <p14:creationId xmlns:p14="http://schemas.microsoft.com/office/powerpoint/2010/main" val="1718298563"/>
+        <p14:creationId xmlns:p14="http://schemas.microsoft.com/office/powerpoint/2010/main" val="1953563943"/>
       </p:ext>
     </p:extLst>
   </p:cSld>
@@ -5357,7 +5357,7 @@
           <a:p>
             <a:fld id="{5BCAD085-E8A6-8845-BD4E-CB4CCA059FC4}" type="datetimeFigureOut">
               <a:rPr lang="en-US" smtClean="0"/>
-              <a:t>10/3/25</a:t>
+              <a:t>10/3/2025</a:t>
             </a:fld>
             <a:endParaRPr lang="en-US"/>
           </a:p>
@@ -5444,29 +5444,29 @@
     </p:spTree>
     <p:extLst>
       <p:ext uri="{BB962C8B-B14F-4D97-AF65-F5344CB8AC3E}">
-        <p14:creationId xmlns:p14="http://schemas.microsoft.com/office/powerpoint/2010/main" val="1622506219"/>
+        <p14:creationId xmlns:p14="http://schemas.microsoft.com/office/powerpoint/2010/main" val="2997011103"/>
       </p:ext>
     </p:extLst>
   </p:cSld>
   <p:clrMap bg1="dk1" tx1="lt1" bg2="dk2" tx2="lt2" accent1="accent1" accent2="accent2" accent3="accent3" accent4="accent4" accent5="accent5" accent6="accent6" hlink="hlink" folHlink="folHlink"/>
   <p:sldLayoutIdLst>
-    <p:sldLayoutId id="2147483661" r:id="rId1"/>
-    <p:sldLayoutId id="2147483662" r:id="rId2"/>
-    <p:sldLayoutId id="2147483663" r:id="rId3"/>
-    <p:sldLayoutId id="2147483664" r:id="rId4"/>
-    <p:sldLayoutId id="2147483665" r:id="rId5"/>
-    <p:sldLayoutId id="2147483666" r:id="rId6"/>
-    <p:sldLayoutId id="2147483667" r:id="rId7"/>
-    <p:sldLayoutId id="2147483668" r:id="rId8"/>
-    <p:sldLayoutId id="2147483669" r:id="rId9"/>
-    <p:sldLayoutId id="2147483670" r:id="rId10"/>
-    <p:sldLayoutId id="2147483671" r:id="rId11"/>
-    <p:sldLayoutId id="2147483672" r:id="rId12"/>
-    <p:sldLayoutId id="2147483673" r:id="rId13"/>
-    <p:sldLayoutId id="2147483674" r:id="rId14"/>
-    <p:sldLayoutId id="2147483675" r:id="rId15"/>
-    <p:sldLayoutId id="2147483676" r:id="rId16"/>
-    <p:sldLayoutId id="2147483677" r:id="rId17"/>
+    <p:sldLayoutId id="2147483691" r:id="rId1"/>
+    <p:sldLayoutId id="2147483692" r:id="rId2"/>
+    <p:sldLayoutId id="2147483693" r:id="rId3"/>
+    <p:sldLayoutId id="2147483694" r:id="rId4"/>
+    <p:sldLayoutId id="2147483695" r:id="rId5"/>
+    <p:sldLayoutId id="2147483696" r:id="rId6"/>
+    <p:sldLayoutId id="2147483697" r:id="rId7"/>
+    <p:sldLayoutId id="2147483698" r:id="rId8"/>
+    <p:sldLayoutId id="2147483699" r:id="rId9"/>
+    <p:sldLayoutId id="2147483700" r:id="rId10"/>
+    <p:sldLayoutId id="2147483701" r:id="rId11"/>
+    <p:sldLayoutId id="2147483702" r:id="rId12"/>
+    <p:sldLayoutId id="2147483703" r:id="rId13"/>
+    <p:sldLayoutId id="2147483704" r:id="rId14"/>
+    <p:sldLayoutId id="2147483705" r:id="rId15"/>
+    <p:sldLayoutId id="2147483706" r:id="rId16"/>
+    <p:sldLayoutId id="2147483707" r:id="rId17"/>
   </p:sldLayoutIdLst>
   <p:txStyles>
     <p:titleStyle>

</xml_diff>